<commit_message>
finanlized section 2 and section 3 slides
</commit_message>
<xml_diff>
--- a/master_files/materials/00_agenda.pptx
+++ b/master_files/materials/00_agenda.pptx
@@ -4446,6 +4446,19 @@
             </a:r>
           </a:p>
           <a:p>
+            <a:pPr lvl="1"/>
+            <a:r>
+              <a:rPr lang="en-US" dirty="0">
+                <a:hlinkClick r:id="rId2"/>
+              </a:rPr>
+              <a:t>https://smdm.org/hub/page/smdm-conduct-policy</a:t>
+            </a:r>
+            <a:r>
+              <a:rPr lang="en-US" dirty="0"/>
+              <a:t> </a:t>
+            </a:r>
+          </a:p>
+          <a:p>
             <a:r>
               <a:rPr lang="en-US" dirty="0"/>
               <a:t>Bathroom locations</a:t>
@@ -4548,7 +4561,9 @@
         </p:nvSpPr>
         <p:spPr/>
         <p:txBody>
-          <a:bodyPr/>
+          <a:bodyPr>
+            <a:normAutofit lnSpcReduction="10000"/>
+          </a:bodyPr>
           <a:lstStyle/>
           <a:p>
             <a:r>
@@ -4688,11 +4703,101 @@
           <a:p>
             <a:r>
               <a:rPr lang="en-US" dirty="0"/>
-              <a:t>All materials are available at </a:t>
-            </a:r>
-          </a:p>
-          <a:p>
-            <a:pPr marL="0" indent="0">
+              <a:t>All materials are available at</a:t>
+            </a:r>
+          </a:p>
+          <a:p>
+            <a:pPr lvl="1"/>
+            <a:r>
+              <a:rPr lang="en-US" sz="2200" b="0" i="0" u="none" strike="noStrike" dirty="0">
+                <a:solidFill>
+                  <a:srgbClr val="000000"/>
+                </a:solidFill>
+                <a:effectLst/>
+                <a:latin typeface="Helvetica" pitchFamily="2" charset="0"/>
+              </a:rPr>
+              <a:t>Through this </a:t>
+            </a:r>
+            <a:r>
+              <a:rPr lang="en-US" sz="2200" b="0" i="0" dirty="0">
+                <a:effectLst/>
+                <a:latin typeface="Helvetica" pitchFamily="2" charset="0"/>
+                <a:hlinkClick r:id="rId2"/>
+              </a:rPr>
+              <a:t>Dropbox link</a:t>
+            </a:r>
+            <a:r>
+              <a:rPr lang="en-US" sz="2200" b="0" i="0" u="none" strike="noStrike" dirty="0">
+                <a:solidFill>
+                  <a:srgbClr val="000000"/>
+                </a:solidFill>
+                <a:effectLst/>
+                <a:latin typeface="Helvetica" pitchFamily="2" charset="0"/>
+              </a:rPr>
+              <a:t> (full link in the email) through 26/11/2024. Password</a:t>
+            </a:r>
+            <a:r>
+              <a:rPr lang="en-US" sz="2200" b="1" i="0" u="none" strike="noStrike" dirty="0">
+                <a:solidFill>
+                  <a:srgbClr val="000000"/>
+                </a:solidFill>
+                <a:effectLst/>
+                <a:latin typeface="Helvetica" pitchFamily="2" charset="0"/>
+              </a:rPr>
+              <a:t> </a:t>
+            </a:r>
+            <a:r>
+              <a:rPr lang="en-US" sz="2200" b="0" i="0" u="none" strike="noStrike" dirty="0">
+                <a:solidFill>
+                  <a:srgbClr val="000000"/>
+                </a:solidFill>
+                <a:effectLst/>
+                <a:latin typeface="Helvetica" pitchFamily="2" charset="0"/>
+              </a:rPr>
+              <a:t>"</a:t>
+            </a:r>
+            <a:r>
+              <a:rPr lang="en-US" sz="2200" b="1" i="0" u="none" strike="noStrike" dirty="0" err="1">
+                <a:solidFill>
+                  <a:srgbClr val="000000"/>
+                </a:solidFill>
+                <a:effectLst/>
+                <a:latin typeface="Helvetica" pitchFamily="2" charset="0"/>
+              </a:rPr>
+              <a:t>smdm_boston</a:t>
+            </a:r>
+            <a:r>
+              <a:rPr lang="en-US" sz="2200" b="0" i="0" u="none" strike="noStrike" dirty="0">
+                <a:solidFill>
+                  <a:srgbClr val="000000"/>
+                </a:solidFill>
+                <a:effectLst/>
+                <a:latin typeface="Helvetica" pitchFamily="2" charset="0"/>
+              </a:rPr>
+              <a:t>", </a:t>
+            </a:r>
+            <a:r>
+              <a:rPr lang="en-US" sz="2200" dirty="0"/>
+              <a:t> </a:t>
+            </a:r>
+          </a:p>
+          <a:p>
+            <a:pPr lvl="1"/>
+            <a:r>
+              <a:rPr lang="en-US" dirty="0">
+                <a:latin typeface="Courier New" panose="02070309020205020404" pitchFamily="49" charset="0"/>
+                <a:cs typeface="Courier New" panose="02070309020205020404" pitchFamily="49" charset="0"/>
+                <a:hlinkClick r:id="rId3"/>
+              </a:rPr>
+              <a:t>https://github.com/ttrikalin/des-R-course</a:t>
+            </a:r>
+            <a:endParaRPr lang="en-US" dirty="0">
+              <a:latin typeface="Courier New" panose="02070309020205020404" pitchFamily="49" charset="0"/>
+              <a:cs typeface="Courier New" panose="02070309020205020404" pitchFamily="49" charset="0"/>
+            </a:endParaRPr>
+          </a:p>
+          <a:p>
+            <a:pPr marL="457200" lvl="1" indent="0">
               <a:buNone/>
             </a:pPr>
             <a:r>
@@ -4700,31 +4805,7 @@
                 <a:latin typeface="Courier New" panose="02070309020205020404" pitchFamily="49" charset="0"/>
                 <a:cs typeface="Courier New" panose="02070309020205020404" pitchFamily="49" charset="0"/>
               </a:rPr>
-              <a:t>  </a:t>
-            </a:r>
-            <a:r>
-              <a:rPr lang="en-US" dirty="0">
-                <a:latin typeface="Courier New" panose="02070309020205020404" pitchFamily="49" charset="0"/>
-                <a:cs typeface="Courier New" panose="02070309020205020404" pitchFamily="49" charset="0"/>
-                <a:hlinkClick r:id="rId2"/>
-              </a:rPr>
-              <a:t>https://github.com/ttrikalin/des-R-course</a:t>
-            </a:r>
-            <a:endParaRPr lang="en-US" dirty="0">
-              <a:latin typeface="Courier New" panose="02070309020205020404" pitchFamily="49" charset="0"/>
-              <a:cs typeface="Courier New" panose="02070309020205020404" pitchFamily="49" charset="0"/>
-            </a:endParaRPr>
-          </a:p>
-          <a:p>
-            <a:pPr marL="0" indent="0">
-              <a:buNone/>
-            </a:pPr>
-            <a:r>
-              <a:rPr lang="en-US" dirty="0">
-                <a:latin typeface="Courier New" panose="02070309020205020404" pitchFamily="49" charset="0"/>
-                <a:cs typeface="Courier New" panose="02070309020205020404" pitchFamily="49" charset="0"/>
-              </a:rPr>
-              <a:t>  (smdm_2024 </a:t>
+              <a:t>(smdm_2024 </a:t>
             </a:r>
             <a:r>
               <a:rPr lang="en-US" dirty="0"/>
@@ -4865,25 +4946,7 @@
                 <a:ea typeface="Aptos" panose="020B0004020202020204" pitchFamily="34" charset="0"/>
                 <a:cs typeface="Times New Roman" panose="02020603050405020304" pitchFamily="18" charset="0"/>
               </a:rPr>
-              <a:t>Three properties of NHPPPs (</a:t>
-            </a:r>
-            <a:r>
-              <a:rPr lang="en-US" kern="100" dirty="0" err="1">
-                <a:effectLst/>
-                <a:latin typeface="Aptos" panose="020B0004020202020204" pitchFamily="34" charset="0"/>
-                <a:ea typeface="Aptos" panose="020B0004020202020204" pitchFamily="34" charset="0"/>
-                <a:cs typeface="Times New Roman" panose="02020603050405020304" pitchFamily="18" charset="0"/>
-              </a:rPr>
-              <a:t>memorylessness</a:t>
-            </a:r>
-            <a:r>
-              <a:rPr lang="en-US" kern="100" dirty="0">
-                <a:effectLst/>
-                <a:latin typeface="Aptos" panose="020B0004020202020204" pitchFamily="34" charset="0"/>
-                <a:ea typeface="Aptos" panose="020B0004020202020204" pitchFamily="34" charset="0"/>
-                <a:cs typeface="Times New Roman" panose="02020603050405020304" pitchFamily="18" charset="0"/>
-              </a:rPr>
-              <a:t>, composability, and transmutation by transforming the time axis) that are important for simulation</a:t>
+              <a:t>How a basic DES is organized</a:t>
             </a:r>
           </a:p>
           <a:p>
@@ -4897,11 +4960,21 @@
             </a:pPr>
             <a:r>
               <a:rPr lang="en-US" kern="100" dirty="0">
+                <a:effectLst/>
                 <a:latin typeface="Aptos" panose="020B0004020202020204" pitchFamily="34" charset="0"/>
                 <a:ea typeface="Aptos" panose="020B0004020202020204" pitchFamily="34" charset="0"/>
                 <a:cs typeface="Times New Roman" panose="02020603050405020304" pitchFamily="18" charset="0"/>
               </a:rPr>
-              <a:t>Sampling a</a:t>
+              <a:t>Three properties of NHPPPs (</a:t>
+            </a:r>
+            <a:r>
+              <a:rPr lang="en-US" kern="100" dirty="0" err="1">
+                <a:effectLst/>
+                <a:latin typeface="Aptos" panose="020B0004020202020204" pitchFamily="34" charset="0"/>
+                <a:ea typeface="Aptos" panose="020B0004020202020204" pitchFamily="34" charset="0"/>
+                <a:cs typeface="Times New Roman" panose="02020603050405020304" pitchFamily="18" charset="0"/>
+              </a:rPr>
+              <a:t>memorylessness</a:t>
             </a:r>
             <a:r>
               <a:rPr lang="en-US" kern="100" dirty="0">
@@ -4910,60 +4983,7 @@
                 <a:ea typeface="Aptos" panose="020B0004020202020204" pitchFamily="34" charset="0"/>
                 <a:cs typeface="Times New Roman" panose="02020603050405020304" pitchFamily="18" charset="0"/>
               </a:rPr>
-              <a:t>lgorithms and their use via </a:t>
-            </a:r>
-            <a:r>
-              <a:rPr lang="en-US" kern="100" dirty="0">
-                <a:effectLst/>
-                <a:latin typeface="Courier New" panose="02070309020205020404" pitchFamily="49" charset="0"/>
-                <a:ea typeface="Aptos" panose="020B0004020202020204" pitchFamily="34" charset="0"/>
-                <a:cs typeface="Times New Roman" panose="02020603050405020304" pitchFamily="18" charset="0"/>
-              </a:rPr>
-              <a:t>R</a:t>
-            </a:r>
-            <a:r>
-              <a:rPr lang="en-US" kern="100" dirty="0">
-                <a:latin typeface="Aptos" panose="020B0004020202020204" pitchFamily="34" charset="0"/>
-                <a:ea typeface="Aptos" panose="020B0004020202020204" pitchFamily="34" charset="0"/>
-                <a:cs typeface="Times New Roman" panose="02020603050405020304" pitchFamily="18" charset="0"/>
-              </a:rPr>
-              <a:t>’s</a:t>
-            </a:r>
-            <a:r>
-              <a:rPr lang="en-US" kern="100" dirty="0">
-                <a:effectLst/>
-                <a:latin typeface="Aptos" panose="020B0004020202020204" pitchFamily="34" charset="0"/>
-                <a:ea typeface="Aptos" panose="020B0004020202020204" pitchFamily="34" charset="0"/>
-                <a:cs typeface="Times New Roman" panose="02020603050405020304" pitchFamily="18" charset="0"/>
-              </a:rPr>
-              <a:t> </a:t>
-            </a:r>
-            <a:r>
-              <a:rPr lang="en-US" b="1" kern="100" dirty="0" err="1">
-                <a:effectLst/>
-                <a:latin typeface="Aptos" panose="020B0004020202020204" pitchFamily="34" charset="0"/>
-                <a:ea typeface="Aptos" panose="020B0004020202020204" pitchFamily="34" charset="0"/>
-                <a:cs typeface="Times New Roman" panose="02020603050405020304" pitchFamily="18" charset="0"/>
-              </a:rPr>
-              <a:t>nhppp</a:t>
-            </a:r>
-            <a:r>
-              <a:rPr lang="en-US" b="1" kern="100" dirty="0">
-                <a:effectLst/>
-                <a:latin typeface="Aptos" panose="020B0004020202020204" pitchFamily="34" charset="0"/>
-                <a:ea typeface="Aptos" panose="020B0004020202020204" pitchFamily="34" charset="0"/>
-                <a:cs typeface="Times New Roman" panose="02020603050405020304" pitchFamily="18" charset="0"/>
-              </a:rPr>
-              <a:t> </a:t>
-            </a:r>
-            <a:r>
-              <a:rPr lang="en-US" kern="100" dirty="0">
-                <a:effectLst/>
-                <a:latin typeface="Aptos" panose="020B0004020202020204" pitchFamily="34" charset="0"/>
-                <a:ea typeface="Aptos" panose="020B0004020202020204" pitchFamily="34" charset="0"/>
-                <a:cs typeface="Times New Roman" panose="02020603050405020304" pitchFamily="18" charset="0"/>
-              </a:rPr>
-              <a:t>package</a:t>
+              <a:t>, composability, and transmutation by transforming the time axis) that are important for simulation</a:t>
             </a:r>
           </a:p>
           <a:p>
@@ -4977,13 +4997,80 @@
             </a:pPr>
             <a:r>
               <a:rPr lang="en-US" kern="100" dirty="0">
+                <a:latin typeface="Aptos" panose="020B0004020202020204" pitchFamily="34" charset="0"/>
+                <a:ea typeface="Aptos" panose="020B0004020202020204" pitchFamily="34" charset="0"/>
+                <a:cs typeface="Times New Roman" panose="02020603050405020304" pitchFamily="18" charset="0"/>
+              </a:rPr>
+              <a:t>Sampling a</a:t>
+            </a:r>
+            <a:r>
+              <a:rPr lang="en-US" kern="100" dirty="0">
                 <a:effectLst/>
                 <a:latin typeface="Aptos" panose="020B0004020202020204" pitchFamily="34" charset="0"/>
                 <a:ea typeface="Aptos" panose="020B0004020202020204" pitchFamily="34" charset="0"/>
                 <a:cs typeface="Times New Roman" panose="02020603050405020304" pitchFamily="18" charset="0"/>
               </a:rPr>
-              <a:t>How to structure the code of a basic DES</a:t>
-            </a:r>
+              <a:t>lgorithms and their use via </a:t>
+            </a:r>
+            <a:r>
+              <a:rPr lang="en-US" kern="100" dirty="0">
+                <a:effectLst/>
+                <a:latin typeface="Courier New" panose="02070309020205020404" pitchFamily="49" charset="0"/>
+                <a:ea typeface="Aptos" panose="020B0004020202020204" pitchFamily="34" charset="0"/>
+                <a:cs typeface="Times New Roman" panose="02020603050405020304" pitchFamily="18" charset="0"/>
+              </a:rPr>
+              <a:t>R</a:t>
+            </a:r>
+            <a:r>
+              <a:rPr lang="en-US" kern="100" dirty="0">
+                <a:latin typeface="Aptos" panose="020B0004020202020204" pitchFamily="34" charset="0"/>
+                <a:ea typeface="Aptos" panose="020B0004020202020204" pitchFamily="34" charset="0"/>
+                <a:cs typeface="Times New Roman" panose="02020603050405020304" pitchFamily="18" charset="0"/>
+              </a:rPr>
+              <a:t>’s</a:t>
+            </a:r>
+            <a:r>
+              <a:rPr lang="en-US" kern="100" dirty="0">
+                <a:effectLst/>
+                <a:latin typeface="Aptos" panose="020B0004020202020204" pitchFamily="34" charset="0"/>
+                <a:ea typeface="Aptos" panose="020B0004020202020204" pitchFamily="34" charset="0"/>
+                <a:cs typeface="Times New Roman" panose="02020603050405020304" pitchFamily="18" charset="0"/>
+              </a:rPr>
+              <a:t> </a:t>
+            </a:r>
+            <a:r>
+              <a:rPr lang="en-US" b="1" kern="100" dirty="0" err="1">
+                <a:effectLst/>
+                <a:latin typeface="Aptos" panose="020B0004020202020204" pitchFamily="34" charset="0"/>
+                <a:ea typeface="Aptos" panose="020B0004020202020204" pitchFamily="34" charset="0"/>
+                <a:cs typeface="Times New Roman" panose="02020603050405020304" pitchFamily="18" charset="0"/>
+              </a:rPr>
+              <a:t>nhppp</a:t>
+            </a:r>
+            <a:r>
+              <a:rPr lang="en-US" b="1" kern="100">
+                <a:effectLst/>
+                <a:latin typeface="Aptos" panose="020B0004020202020204" pitchFamily="34" charset="0"/>
+                <a:ea typeface="Aptos" panose="020B0004020202020204" pitchFamily="34" charset="0"/>
+                <a:cs typeface="Times New Roman" panose="02020603050405020304" pitchFamily="18" charset="0"/>
+              </a:rPr>
+              <a:t> </a:t>
+            </a:r>
+            <a:r>
+              <a:rPr lang="en-US" kern="100">
+                <a:effectLst/>
+                <a:latin typeface="Aptos" panose="020B0004020202020204" pitchFamily="34" charset="0"/>
+                <a:ea typeface="Aptos" panose="020B0004020202020204" pitchFamily="34" charset="0"/>
+                <a:cs typeface="Times New Roman" panose="02020603050405020304" pitchFamily="18" charset="0"/>
+              </a:rPr>
+              <a:t>package</a:t>
+            </a:r>
+            <a:endParaRPr lang="en-US" kern="100" dirty="0">
+              <a:effectLst/>
+              <a:latin typeface="Aptos" panose="020B0004020202020204" pitchFamily="34" charset="0"/>
+              <a:ea typeface="Aptos" panose="020B0004020202020204" pitchFamily="34" charset="0"/>
+              <a:cs typeface="Times New Roman" panose="02020603050405020304" pitchFamily="18" charset="0"/>
+            </a:endParaRPr>
           </a:p>
         </p:txBody>
       </p:sp>

</xml_diff>